<commit_message>
correction texte: modifier _prédire_ par _détecter_
</commit_message>
<xml_diff>
--- a/admin/skin_project_Transfert_Learning.pptx
+++ b/admin/skin_project_Transfert_Learning.pptx
@@ -5163,7 +5163,7 @@
         <p:spPr>
           <a:xfrm>
             <a:off x="262644" y="2941396"/>
-            <a:ext cx="3365212" cy="276999"/>
+            <a:ext cx="3365212" cy="246221"/>
           </a:xfrm>
           <a:prstGeom prst="rect">
             <a:avLst/>
@@ -5177,8 +5177,8 @@
           <a:lstStyle/>
           <a:p>
             <a:r>
-              <a:rPr lang="fr-FR" sz="1200" dirty="0"/>
-              <a:t>Modèle d’entrainement créé pour prédire 3 cas</a:t>
+              <a:rPr lang="fr-FR" sz="1000" b="1" dirty="0"/>
+              <a:t>Modèle d’entrainement créé pour détecter 3 cas</a:t>
             </a:r>
           </a:p>
         </p:txBody>
@@ -5323,7 +5323,7 @@
         <p:spPr>
           <a:xfrm>
             <a:off x="3806290" y="2941396"/>
-            <a:ext cx="4998940" cy="276999"/>
+            <a:ext cx="5026010" cy="246221"/>
           </a:xfrm>
           <a:prstGeom prst="rect">
             <a:avLst/>
@@ -5337,16 +5337,8 @@
           <a:lstStyle/>
           <a:p>
             <a:r>
-              <a:rPr lang="fr-FR" sz="1200" dirty="0"/>
-              <a:t>Utilisation du modèle </a:t>
-            </a:r>
-            <a:r>
-              <a:rPr lang="fr-FR" sz="1100" dirty="0"/>
-              <a:t>INCEPTIONV3</a:t>
-            </a:r>
-            <a:r>
-              <a:rPr lang="fr-FR" sz="1200" dirty="0"/>
-              <a:t> pour classer 24 maladies de peau</a:t>
+              <a:rPr lang="fr-FR" sz="1000" b="1" dirty="0"/>
+              <a:t>Utilisation du modèle INCEPTIONV3 pour classer 24 maladies de peau</a:t>
             </a:r>
           </a:p>
         </p:txBody>

</xml_diff>